<commit_message>
update TDD hands on 3 document
</commit_message>
<xml_diff>
--- a/Documents/TDD Hands On 3.pptx
+++ b/Documents/TDD Hands On 3.pptx
@@ -7,6 +7,10 @@
   <p:sldIdLst>
     <p:sldId id="256" r:id="rId2"/>
     <p:sldId id="257" r:id="rId3"/>
+    <p:sldId id="258" r:id="rId4"/>
+    <p:sldId id="260" r:id="rId5"/>
+    <p:sldId id="261" r:id="rId6"/>
+    <p:sldId id="259" r:id="rId7"/>
   </p:sldIdLst>
   <p:sldSz cx="9144000" cy="6858000" type="screen4x3"/>
   <p:notesSz cx="6858000" cy="9144000"/>
@@ -3152,6 +3156,13 @@
   <p:clrMapOvr>
     <a:masterClrMapping/>
   </p:clrMapOvr>
+  <p:timing>
+    <p:tnLst>
+      <p:par>
+        <p:cTn id="1" dur="indefinite" restart="never" nodeType="tmRoot"/>
+      </p:par>
+    </p:tnLst>
+  </p:timing>
 </p:sld>
 </file>
 
@@ -3191,7 +3202,7 @@
           <a:p>
             <a:r>
               <a:rPr lang="en-US" dirty="0" smtClean="0"/>
-              <a:t>BDD</a:t>
+              <a:t>ATDD</a:t>
             </a:r>
             <a:endParaRPr lang="en-US" dirty="0"/>
           </a:p>
@@ -3206,7 +3217,7 @@
         <p:spPr>
           <a:xfrm>
             <a:off x="381000" y="1371600"/>
-            <a:ext cx="8534400" cy="4801314"/>
+            <a:ext cx="8534400" cy="5139869"/>
           </a:xfrm>
           <a:prstGeom prst="rect">
             <a:avLst/>
@@ -3219,7 +3230,7 @@
           <a:lstStyle/>
           <a:p>
             <a:r>
-              <a:rPr lang="en-US" b="1" dirty="0" smtClean="0">
+              <a:rPr lang="en-US" sz="2800" b="1" dirty="0" smtClean="0">
                 <a:effectLst/>
               </a:rPr>
               <a:t>Story</a:t>
@@ -3276,10 +3287,16 @@
           </a:p>
           <a:p>
             <a:r>
+              <a:rPr lang="en-US" sz="2400" b="1" dirty="0" smtClean="0">
+                <a:effectLst/>
+              </a:rPr>
+              <a:t>Scenario</a:t>
+            </a:r>
+            <a:r>
               <a:rPr lang="en-US" b="1" dirty="0" smtClean="0">
                 <a:effectLst/>
               </a:rPr>
-              <a:t>Scenario 1:</a:t>
+              <a:t> 1:</a:t>
             </a:r>
             <a:r>
               <a:rPr lang="en-US" dirty="0" smtClean="0">
@@ -3349,10 +3366,16 @@
           </a:p>
           <a:p>
             <a:r>
+              <a:rPr lang="en-US" sz="2400" b="1" dirty="0" smtClean="0">
+                <a:effectLst/>
+              </a:rPr>
+              <a:t>Scenario</a:t>
+            </a:r>
+            <a:r>
               <a:rPr lang="en-US" b="1" dirty="0" smtClean="0">
                 <a:effectLst/>
               </a:rPr>
-              <a:t>Scenario 2:</a:t>
+              <a:t> 2:</a:t>
             </a:r>
             <a:r>
               <a:rPr lang="en-US" dirty="0" smtClean="0">
@@ -3458,6 +3481,1471 @@
   <p:clrMapOvr>
     <a:masterClrMapping/>
   </p:clrMapOvr>
+  <p:timing>
+    <p:tnLst>
+      <p:par>
+        <p:cTn id="1" dur="indefinite" restart="never" nodeType="tmRoot"/>
+      </p:par>
+    </p:tnLst>
+  </p:timing>
+</p:sld>
+</file>
+
+<file path=ppt/slides/slide3.xml><?xml version="1.0" encoding="utf-8"?>
+<p:sld xmlns:a="http://schemas.openxmlformats.org/drawingml/2006/main" xmlns:r="http://schemas.openxmlformats.org/officeDocument/2006/relationships" xmlns:p="http://schemas.openxmlformats.org/presentationml/2006/main">
+  <p:cSld>
+    <p:spTree>
+      <p:nvGrpSpPr>
+        <p:cNvPr id="1" name=""/>
+        <p:cNvGrpSpPr/>
+        <p:nvPr/>
+      </p:nvGrpSpPr>
+      <p:grpSpPr>
+        <a:xfrm>
+          <a:off x="0" y="0"/>
+          <a:ext cx="0" cy="0"/>
+          <a:chOff x="0" y="0"/>
+          <a:chExt cx="0" cy="0"/>
+        </a:xfrm>
+      </p:grpSpPr>
+      <p:sp>
+        <p:nvSpPr>
+          <p:cNvPr id="2" name="Title 1"/>
+          <p:cNvSpPr>
+            <a:spLocks noGrp="1"/>
+          </p:cNvSpPr>
+          <p:nvPr>
+            <p:ph type="title"/>
+          </p:nvPr>
+        </p:nvSpPr>
+        <p:spPr/>
+        <p:txBody>
+          <a:bodyPr/>
+          <a:lstStyle/>
+          <a:p>
+            <a:r>
+              <a:rPr lang="en-US" dirty="0" smtClean="0"/>
+              <a:t>Game Of Life</a:t>
+            </a:r>
+            <a:endParaRPr lang="en-US" dirty="0"/>
+          </a:p>
+        </p:txBody>
+      </p:sp>
+      <p:sp>
+        <p:nvSpPr>
+          <p:cNvPr id="4" name="Rectangle 3"/>
+          <p:cNvSpPr/>
+          <p:nvPr/>
+        </p:nvSpPr>
+        <p:spPr>
+          <a:xfrm>
+            <a:off x="457200" y="1371600"/>
+            <a:ext cx="8229600" cy="5355312"/>
+          </a:xfrm>
+          <a:prstGeom prst="rect">
+            <a:avLst/>
+          </a:prstGeom>
+        </p:spPr>
+        <p:txBody>
+          <a:bodyPr wrap="square">
+            <a:spAutoFit/>
+          </a:bodyPr>
+          <a:lstStyle/>
+          <a:p>
+            <a:r>
+              <a:rPr lang="en-US" dirty="0" smtClean="0"/>
+              <a:t>This Kata is about calculating the next generation of Conway's game of life, given any starting position. See </a:t>
+            </a:r>
+            <a:r>
+              <a:rPr lang="en-US" dirty="0" smtClean="0">
+                <a:hlinkClick r:id="rId2"/>
+              </a:rPr>
+              <a:t>http://en.wikipedia.org/wiki/Conway%27s_Game_of_Life</a:t>
+            </a:r>
+            <a:r>
+              <a:rPr lang="en-US" dirty="0" smtClean="0"/>
+              <a:t> for background. </a:t>
+            </a:r>
+          </a:p>
+          <a:p>
+            <a:endParaRPr lang="en-US" dirty="0" smtClean="0"/>
+          </a:p>
+          <a:p>
+            <a:r>
+              <a:rPr lang="en-US" dirty="0" smtClean="0"/>
+              <a:t>You start with a configure file defining a two dimensional grid of cells defined, where each cell is either alive or dead. The grid is finite, and no life can exist off the edges. When </a:t>
+            </a:r>
+            <a:r>
+              <a:rPr lang="en-US" dirty="0" err="1" smtClean="0"/>
+              <a:t>calcuating</a:t>
+            </a:r>
+            <a:r>
+              <a:rPr lang="en-US" dirty="0" smtClean="0"/>
+              <a:t> the next generation of the grid, follow these rules: </a:t>
+            </a:r>
+          </a:p>
+          <a:p>
+            <a:endParaRPr lang="en-US" dirty="0" smtClean="0"/>
+          </a:p>
+          <a:p>
+            <a:r>
+              <a:rPr lang="en-US" dirty="0" smtClean="0"/>
+              <a:t>   1. Any live cell with fewer than two live neighbors dies, as if caused by under population. </a:t>
+            </a:r>
+            <a:r>
+              <a:rPr lang="zh-CN" altLang="en-US" dirty="0"/>
+              <a:t>（</a:t>
+            </a:r>
+            <a:r>
+              <a:rPr lang="zh-CN" altLang="en-US" dirty="0" smtClean="0"/>
+              <a:t>如果有少于两个</a:t>
+            </a:r>
+            <a:r>
+              <a:rPr lang="en-US" altLang="zh-CN" dirty="0" smtClean="0"/>
+              <a:t>(</a:t>
+            </a:r>
+            <a:r>
+              <a:rPr lang="zh-CN" altLang="en-US" dirty="0" smtClean="0"/>
+              <a:t>不包含</a:t>
+            </a:r>
+            <a:r>
+              <a:rPr lang="en-US" altLang="zh-CN" dirty="0" smtClean="0"/>
+              <a:t>)</a:t>
+            </a:r>
+            <a:r>
+              <a:rPr lang="zh-CN" altLang="en-US" dirty="0" smtClean="0"/>
+              <a:t>邻居的活细胞在下一代会死去）</a:t>
+            </a:r>
+            <a:endParaRPr lang="en-US" dirty="0" smtClean="0"/>
+          </a:p>
+          <a:p>
+            <a:r>
+              <a:rPr lang="en-US" dirty="0" smtClean="0"/>
+              <a:t>   2. Any live cell with more than three live neighbors dies, as if by overcrowding.</a:t>
+            </a:r>
+          </a:p>
+          <a:p>
+            <a:r>
+              <a:rPr lang="zh-CN" altLang="en-US" dirty="0" smtClean="0"/>
+              <a:t>（如果有多于三个</a:t>
+            </a:r>
+            <a:r>
+              <a:rPr lang="en-US" altLang="zh-CN" dirty="0" smtClean="0"/>
+              <a:t>(</a:t>
+            </a:r>
+            <a:r>
+              <a:rPr lang="zh-CN" altLang="en-US" dirty="0" smtClean="0"/>
+              <a:t>不包含</a:t>
+            </a:r>
+            <a:r>
+              <a:rPr lang="en-US" altLang="zh-CN" dirty="0" smtClean="0"/>
+              <a:t>)</a:t>
+            </a:r>
+            <a:r>
+              <a:rPr lang="zh-CN" altLang="en-US" dirty="0" smtClean="0"/>
+              <a:t>邻居的活细胞在下一代会死去）</a:t>
+            </a:r>
+            <a:endParaRPr lang="en-US" dirty="0" smtClean="0"/>
+          </a:p>
+          <a:p>
+            <a:r>
+              <a:rPr lang="en-US" dirty="0" smtClean="0"/>
+              <a:t>   3. Any live cell with two or three live neighbors lives on to the next generation.</a:t>
+            </a:r>
+          </a:p>
+          <a:p>
+            <a:r>
+              <a:rPr lang="zh-CN" altLang="en-US" dirty="0" smtClean="0"/>
+              <a:t>（如果有两个或三个邻居的活细胞在下一代还活着）</a:t>
+            </a:r>
+            <a:endParaRPr lang="en-US" dirty="0" smtClean="0"/>
+          </a:p>
+          <a:p>
+            <a:r>
+              <a:rPr lang="en-US" dirty="0" smtClean="0"/>
+              <a:t>   4. Any dead cell with exactly three live neighbors becomes a live cell.</a:t>
+            </a:r>
+          </a:p>
+          <a:p>
+            <a:r>
+              <a:rPr lang="zh-CN" altLang="en-US" dirty="0" smtClean="0"/>
+              <a:t>（如果刚好有三个邻居的死细胞在下一代会复活）</a:t>
+            </a:r>
+          </a:p>
+          <a:p>
+            <a:endParaRPr lang="en-US" dirty="0" smtClean="0"/>
+          </a:p>
+          <a:p>
+            <a:r>
+              <a:rPr lang="en-US" dirty="0" smtClean="0"/>
+              <a:t>You should write a program that can accept one configure file, and will output a similar grid showing the next generation in every 1 second. </a:t>
+            </a:r>
+            <a:endParaRPr lang="en-US" dirty="0"/>
+          </a:p>
+        </p:txBody>
+      </p:sp>
+    </p:spTree>
+    <p:extLst>
+      <p:ext uri="{BB962C8B-B14F-4D97-AF65-F5344CB8AC3E}">
+        <p14:creationId xmlns:p14="http://schemas.microsoft.com/office/powerpoint/2010/main" val="2494763573"/>
+      </p:ext>
+    </p:extLst>
+  </p:cSld>
+  <p:clrMapOvr>
+    <a:masterClrMapping/>
+  </p:clrMapOvr>
+  <p:timing>
+    <p:tnLst>
+      <p:par>
+        <p:cTn id="1" dur="indefinite" restart="never" nodeType="tmRoot"/>
+      </p:par>
+    </p:tnLst>
+  </p:timing>
+</p:sld>
+</file>
+
+<file path=ppt/slides/slide4.xml><?xml version="1.0" encoding="utf-8"?>
+<p:sld xmlns:a="http://schemas.openxmlformats.org/drawingml/2006/main" xmlns:r="http://schemas.openxmlformats.org/officeDocument/2006/relationships" xmlns:p="http://schemas.openxmlformats.org/presentationml/2006/main">
+  <p:cSld>
+    <p:spTree>
+      <p:nvGrpSpPr>
+        <p:cNvPr id="1" name=""/>
+        <p:cNvGrpSpPr/>
+        <p:nvPr/>
+      </p:nvGrpSpPr>
+      <p:grpSpPr>
+        <a:xfrm>
+          <a:off x="0" y="0"/>
+          <a:ext cx="0" cy="0"/>
+          <a:chOff x="0" y="0"/>
+          <a:chExt cx="0" cy="0"/>
+        </a:xfrm>
+      </p:grpSpPr>
+      <p:pic>
+        <p:nvPicPr>
+          <p:cNvPr id="4" name="Picture 3"/>
+          <p:cNvPicPr>
+            <a:picLocks noChangeAspect="1"/>
+          </p:cNvPicPr>
+          <p:nvPr/>
+        </p:nvPicPr>
+        <p:blipFill>
+          <a:blip r:embed="rId2">
+            <a:extLst>
+              <a:ext uri="{28A0092B-C50C-407E-A947-70E740481C1C}">
+                <a14:useLocalDpi xmlns:a14="http://schemas.microsoft.com/office/drawing/2010/main" val="0"/>
+              </a:ext>
+            </a:extLst>
+          </a:blip>
+          <a:stretch>
+            <a:fillRect/>
+          </a:stretch>
+        </p:blipFill>
+        <p:spPr>
+          <a:xfrm>
+            <a:off x="1424861" y="1972498"/>
+            <a:ext cx="419100" cy="419100"/>
+          </a:xfrm>
+          <a:prstGeom prst="rect">
+            <a:avLst/>
+          </a:prstGeom>
+        </p:spPr>
+      </p:pic>
+      <p:pic>
+        <p:nvPicPr>
+          <p:cNvPr id="5" name="Picture 4"/>
+          <p:cNvPicPr>
+            <a:picLocks noChangeAspect="1"/>
+          </p:cNvPicPr>
+          <p:nvPr/>
+        </p:nvPicPr>
+        <p:blipFill>
+          <a:blip r:embed="rId3">
+            <a:extLst>
+              <a:ext uri="{28A0092B-C50C-407E-A947-70E740481C1C}">
+                <a14:useLocalDpi xmlns:a14="http://schemas.microsoft.com/office/drawing/2010/main" val="0"/>
+              </a:ext>
+            </a:extLst>
+          </a:blip>
+          <a:stretch>
+            <a:fillRect/>
+          </a:stretch>
+        </p:blipFill>
+        <p:spPr>
+          <a:xfrm>
+            <a:off x="1424861" y="3392450"/>
+            <a:ext cx="622300" cy="622300"/>
+          </a:xfrm>
+          <a:prstGeom prst="rect">
+            <a:avLst/>
+          </a:prstGeom>
+        </p:spPr>
+      </p:pic>
+      <p:pic>
+        <p:nvPicPr>
+          <p:cNvPr id="6" name="Picture 5"/>
+          <p:cNvPicPr>
+            <a:picLocks noChangeAspect="1"/>
+          </p:cNvPicPr>
+          <p:nvPr/>
+        </p:nvPicPr>
+        <p:blipFill>
+          <a:blip r:embed="rId4">
+            <a:extLst>
+              <a:ext uri="{28A0092B-C50C-407E-A947-70E740481C1C}">
+                <a14:useLocalDpi xmlns:a14="http://schemas.microsoft.com/office/drawing/2010/main" val="0"/>
+              </a:ext>
+            </a:extLst>
+          </a:blip>
+          <a:stretch>
+            <a:fillRect/>
+          </a:stretch>
+        </p:blipFill>
+        <p:spPr>
+          <a:xfrm>
+            <a:off x="3998161" y="1911350"/>
+            <a:ext cx="520700" cy="520700"/>
+          </a:xfrm>
+          <a:prstGeom prst="rect">
+            <a:avLst/>
+          </a:prstGeom>
+        </p:spPr>
+      </p:pic>
+      <p:pic>
+        <p:nvPicPr>
+          <p:cNvPr id="7" name="Picture 6"/>
+          <p:cNvPicPr>
+            <a:picLocks noChangeAspect="1"/>
+          </p:cNvPicPr>
+          <p:nvPr/>
+        </p:nvPicPr>
+        <p:blipFill>
+          <a:blip r:embed="rId5">
+            <a:extLst>
+              <a:ext uri="{28A0092B-C50C-407E-A947-70E740481C1C}">
+                <a14:useLocalDpi xmlns:a14="http://schemas.microsoft.com/office/drawing/2010/main" val="0"/>
+              </a:ext>
+            </a:extLst>
+          </a:blip>
+          <a:stretch>
+            <a:fillRect/>
+          </a:stretch>
+        </p:blipFill>
+        <p:spPr>
+          <a:xfrm>
+            <a:off x="6436561" y="1911350"/>
+            <a:ext cx="622300" cy="622300"/>
+          </a:xfrm>
+          <a:prstGeom prst="rect">
+            <a:avLst/>
+          </a:prstGeom>
+        </p:spPr>
+      </p:pic>
+      <p:pic>
+        <p:nvPicPr>
+          <p:cNvPr id="8" name="Picture 7"/>
+          <p:cNvPicPr>
+            <a:picLocks noChangeAspect="1"/>
+          </p:cNvPicPr>
+          <p:nvPr/>
+        </p:nvPicPr>
+        <p:blipFill>
+          <a:blip r:embed="rId6">
+            <a:extLst>
+              <a:ext uri="{28A0092B-C50C-407E-A947-70E740481C1C}">
+                <a14:useLocalDpi xmlns:a14="http://schemas.microsoft.com/office/drawing/2010/main" val="0"/>
+              </a:ext>
+            </a:extLst>
+          </a:blip>
+          <a:stretch>
+            <a:fillRect/>
+          </a:stretch>
+        </p:blipFill>
+        <p:spPr>
+          <a:xfrm>
+            <a:off x="3931315" y="3419722"/>
+            <a:ext cx="3183819" cy="2292350"/>
+          </a:xfrm>
+          <a:prstGeom prst="rect">
+            <a:avLst/>
+          </a:prstGeom>
+          <a:ln w="3175">
+            <a:solidFill>
+              <a:schemeClr val="bg1">
+                <a:lumMod val="75000"/>
+              </a:schemeClr>
+            </a:solidFill>
+          </a:ln>
+        </p:spPr>
+      </p:pic>
+      <p:sp>
+        <p:nvSpPr>
+          <p:cNvPr id="25" name="Title 1"/>
+          <p:cNvSpPr txBox="1">
+            <a:spLocks/>
+          </p:cNvSpPr>
+          <p:nvPr/>
+        </p:nvSpPr>
+        <p:spPr>
+          <a:xfrm>
+            <a:off x="457200" y="274638"/>
+            <a:ext cx="8229600" cy="1143000"/>
+          </a:xfrm>
+          <a:prstGeom prst="rect">
+            <a:avLst/>
+          </a:prstGeom>
+        </p:spPr>
+        <p:txBody>
+          <a:bodyPr/>
+          <a:lstStyle>
+            <a:lvl1pPr algn="ctr" defTabSz="914400" rtl="0" eaLnBrk="1" latinLnBrk="0" hangingPunct="1">
+              <a:spcBef>
+                <a:spcPct val="0"/>
+              </a:spcBef>
+              <a:buNone/>
+              <a:defRPr sz="4400" kern="1200">
+                <a:solidFill>
+                  <a:schemeClr val="tx1"/>
+                </a:solidFill>
+                <a:latin typeface="+mj-lt"/>
+                <a:ea typeface="+mj-ea"/>
+                <a:cs typeface="+mj-cs"/>
+              </a:defRPr>
+            </a:lvl1pPr>
+          </a:lstStyle>
+          <a:p>
+            <a:r>
+              <a:rPr lang="en-US" dirty="0" smtClean="0"/>
+              <a:t>Game Of Life</a:t>
+            </a:r>
+            <a:endParaRPr lang="en-US" dirty="0"/>
+          </a:p>
+        </p:txBody>
+      </p:sp>
+      <p:sp>
+        <p:nvSpPr>
+          <p:cNvPr id="10" name="Rectangle 9"/>
+          <p:cNvSpPr/>
+          <p:nvPr/>
+        </p:nvSpPr>
+        <p:spPr>
+          <a:xfrm>
+            <a:off x="2438399" y="1622335"/>
+            <a:ext cx="817853" cy="1200329"/>
+          </a:xfrm>
+          <a:prstGeom prst="rect">
+            <a:avLst/>
+          </a:prstGeom>
+        </p:spPr>
+        <p:txBody>
+          <a:bodyPr wrap="none">
+            <a:spAutoFit/>
+          </a:bodyPr>
+          <a:lstStyle/>
+          <a:p>
+            <a:r>
+              <a:rPr lang="en-US" dirty="0" smtClean="0">
+                <a:latin typeface="Consolas" panose="020B0609020204030204" pitchFamily="49" charset="0"/>
+                <a:cs typeface="Consolas" panose="020B0609020204030204" pitchFamily="49" charset="0"/>
+              </a:rPr>
+              <a:t>.... </a:t>
+            </a:r>
+          </a:p>
+          <a:p>
+            <a:r>
+              <a:rPr lang="en-US" dirty="0" smtClean="0">
+                <a:latin typeface="Consolas" panose="020B0609020204030204" pitchFamily="49" charset="0"/>
+                <a:cs typeface="Consolas" panose="020B0609020204030204" pitchFamily="49" charset="0"/>
+              </a:rPr>
+              <a:t>.**. </a:t>
+            </a:r>
+          </a:p>
+          <a:p>
+            <a:r>
+              <a:rPr lang="en-US" dirty="0" smtClean="0">
+                <a:latin typeface="Consolas" panose="020B0609020204030204" pitchFamily="49" charset="0"/>
+                <a:cs typeface="Consolas" panose="020B0609020204030204" pitchFamily="49" charset="0"/>
+              </a:rPr>
+              <a:t>.**. </a:t>
+            </a:r>
+          </a:p>
+          <a:p>
+            <a:r>
+              <a:rPr lang="en-US" dirty="0" smtClean="0">
+                <a:latin typeface="Consolas" panose="020B0609020204030204" pitchFamily="49" charset="0"/>
+                <a:cs typeface="Consolas" panose="020B0609020204030204" pitchFamily="49" charset="0"/>
+              </a:rPr>
+              <a:t>....</a:t>
+            </a:r>
+            <a:endParaRPr lang="en-US" dirty="0">
+              <a:latin typeface="Consolas" panose="020B0609020204030204" pitchFamily="49" charset="0"/>
+              <a:cs typeface="Consolas" panose="020B0609020204030204" pitchFamily="49" charset="0"/>
+            </a:endParaRPr>
+          </a:p>
+        </p:txBody>
+      </p:sp>
+      <p:sp>
+        <p:nvSpPr>
+          <p:cNvPr id="28" name="Rectangle 27"/>
+          <p:cNvSpPr/>
+          <p:nvPr/>
+        </p:nvSpPr>
+        <p:spPr>
+          <a:xfrm>
+            <a:off x="4894446" y="1571535"/>
+            <a:ext cx="944489" cy="1477328"/>
+          </a:xfrm>
+          <a:prstGeom prst="rect">
+            <a:avLst/>
+          </a:prstGeom>
+        </p:spPr>
+        <p:txBody>
+          <a:bodyPr wrap="none">
+            <a:spAutoFit/>
+          </a:bodyPr>
+          <a:lstStyle/>
+          <a:p>
+            <a:r>
+              <a:rPr lang="en-US" dirty="0" smtClean="0">
+                <a:latin typeface="Consolas" panose="020B0609020204030204" pitchFamily="49" charset="0"/>
+                <a:cs typeface="Consolas" panose="020B0609020204030204" pitchFamily="49" charset="0"/>
+              </a:rPr>
+              <a:t>..</a:t>
+            </a:r>
+            <a:r>
+              <a:rPr lang="en-US" altLang="zh-CN" dirty="0" smtClean="0">
+                <a:latin typeface="Consolas" panose="020B0609020204030204" pitchFamily="49" charset="0"/>
+                <a:cs typeface="Consolas" panose="020B0609020204030204" pitchFamily="49" charset="0"/>
+              </a:rPr>
+              <a:t>.</a:t>
+            </a:r>
+            <a:r>
+              <a:rPr lang="en-US" dirty="0" smtClean="0">
+                <a:latin typeface="Consolas" panose="020B0609020204030204" pitchFamily="49" charset="0"/>
+                <a:cs typeface="Consolas" panose="020B0609020204030204" pitchFamily="49" charset="0"/>
+              </a:rPr>
+              <a:t>..</a:t>
+            </a:r>
+          </a:p>
+          <a:p>
+            <a:r>
+              <a:rPr lang="en-US" dirty="0" smtClean="0">
+                <a:latin typeface="Consolas" panose="020B0609020204030204" pitchFamily="49" charset="0"/>
+                <a:cs typeface="Consolas" panose="020B0609020204030204" pitchFamily="49" charset="0"/>
+              </a:rPr>
+              <a:t>..</a:t>
+            </a:r>
+            <a:r>
+              <a:rPr lang="en-US" altLang="zh-CN" dirty="0" smtClean="0">
+                <a:latin typeface="Consolas" panose="020B0609020204030204" pitchFamily="49" charset="0"/>
+                <a:cs typeface="Consolas" panose="020B0609020204030204" pitchFamily="49" charset="0"/>
+              </a:rPr>
+              <a:t>.</a:t>
+            </a:r>
+            <a:r>
+              <a:rPr lang="en-US" dirty="0" smtClean="0">
+                <a:latin typeface="Consolas" panose="020B0609020204030204" pitchFamily="49" charset="0"/>
+                <a:cs typeface="Consolas" panose="020B0609020204030204" pitchFamily="49" charset="0"/>
+              </a:rPr>
+              <a:t>..</a:t>
+            </a:r>
+            <a:endParaRPr lang="en-US" dirty="0" smtClean="0">
+              <a:latin typeface="Consolas" panose="020B0609020204030204" pitchFamily="49" charset="0"/>
+              <a:cs typeface="Consolas" panose="020B0609020204030204" pitchFamily="49" charset="0"/>
+            </a:endParaRPr>
+          </a:p>
+          <a:p>
+            <a:r>
+              <a:rPr lang="en-US" dirty="0" smtClean="0">
+                <a:latin typeface="Consolas" panose="020B0609020204030204" pitchFamily="49" charset="0"/>
+                <a:cs typeface="Consolas" panose="020B0609020204030204" pitchFamily="49" charset="0"/>
+              </a:rPr>
+              <a:t>.***. </a:t>
+            </a:r>
+          </a:p>
+          <a:p>
+            <a:r>
+              <a:rPr lang="en-US" dirty="0" smtClean="0">
+                <a:latin typeface="Consolas" panose="020B0609020204030204" pitchFamily="49" charset="0"/>
+                <a:cs typeface="Consolas" panose="020B0609020204030204" pitchFamily="49" charset="0"/>
+              </a:rPr>
+              <a:t>..</a:t>
+            </a:r>
+            <a:r>
+              <a:rPr lang="en-US" altLang="zh-CN" dirty="0" smtClean="0">
+                <a:latin typeface="Consolas" panose="020B0609020204030204" pitchFamily="49" charset="0"/>
+                <a:cs typeface="Consolas" panose="020B0609020204030204" pitchFamily="49" charset="0"/>
+              </a:rPr>
+              <a:t>.</a:t>
+            </a:r>
+            <a:r>
+              <a:rPr lang="en-US" dirty="0" smtClean="0">
+                <a:latin typeface="Consolas" panose="020B0609020204030204" pitchFamily="49" charset="0"/>
+                <a:cs typeface="Consolas" panose="020B0609020204030204" pitchFamily="49" charset="0"/>
+              </a:rPr>
+              <a:t>..</a:t>
+            </a:r>
+            <a:endParaRPr lang="en-US" dirty="0" smtClean="0">
+              <a:latin typeface="Consolas" panose="020B0609020204030204" pitchFamily="49" charset="0"/>
+              <a:cs typeface="Consolas" panose="020B0609020204030204" pitchFamily="49" charset="0"/>
+            </a:endParaRPr>
+          </a:p>
+          <a:p>
+            <a:r>
+              <a:rPr lang="en-US" dirty="0" smtClean="0">
+                <a:latin typeface="Consolas" panose="020B0609020204030204" pitchFamily="49" charset="0"/>
+                <a:cs typeface="Consolas" panose="020B0609020204030204" pitchFamily="49" charset="0"/>
+              </a:rPr>
+              <a:t>....</a:t>
+            </a:r>
+            <a:r>
+              <a:rPr lang="en-US" dirty="0" smtClean="0">
+                <a:latin typeface="Consolas" panose="020B0609020204030204" pitchFamily="49" charset="0"/>
+                <a:cs typeface="Consolas" panose="020B0609020204030204" pitchFamily="49" charset="0"/>
+              </a:rPr>
+              <a:t>.</a:t>
+            </a:r>
+            <a:endParaRPr lang="en-US" dirty="0">
+              <a:latin typeface="Consolas" panose="020B0609020204030204" pitchFamily="49" charset="0"/>
+              <a:cs typeface="Consolas" panose="020B0609020204030204" pitchFamily="49" charset="0"/>
+            </a:endParaRPr>
+          </a:p>
+        </p:txBody>
+      </p:sp>
+    </p:spTree>
+    <p:extLst>
+      <p:ext uri="{BB962C8B-B14F-4D97-AF65-F5344CB8AC3E}">
+        <p14:creationId xmlns:p14="http://schemas.microsoft.com/office/powerpoint/2010/main" val="1793175785"/>
+      </p:ext>
+    </p:extLst>
+  </p:cSld>
+  <p:clrMapOvr>
+    <a:masterClrMapping/>
+  </p:clrMapOvr>
+  <p:timing>
+    <p:tnLst>
+      <p:par>
+        <p:cTn id="1" dur="indefinite" restart="never" nodeType="tmRoot"/>
+      </p:par>
+    </p:tnLst>
+  </p:timing>
+</p:sld>
+</file>
+
+<file path=ppt/slides/slide5.xml><?xml version="1.0" encoding="utf-8"?>
+<p:sld xmlns:a="http://schemas.openxmlformats.org/drawingml/2006/main" xmlns:r="http://schemas.openxmlformats.org/officeDocument/2006/relationships" xmlns:p="http://schemas.openxmlformats.org/presentationml/2006/main">
+  <p:cSld>
+    <p:spTree>
+      <p:nvGrpSpPr>
+        <p:cNvPr id="1" name=""/>
+        <p:cNvGrpSpPr/>
+        <p:nvPr/>
+      </p:nvGrpSpPr>
+      <p:grpSpPr>
+        <a:xfrm>
+          <a:off x="0" y="0"/>
+          <a:ext cx="0" cy="0"/>
+          <a:chOff x="0" y="0"/>
+          <a:chExt cx="0" cy="0"/>
+        </a:xfrm>
+      </p:grpSpPr>
+      <p:sp>
+        <p:nvSpPr>
+          <p:cNvPr id="2" name="Title 1"/>
+          <p:cNvSpPr>
+            <a:spLocks noGrp="1"/>
+          </p:cNvSpPr>
+          <p:nvPr>
+            <p:ph type="title"/>
+          </p:nvPr>
+        </p:nvSpPr>
+        <p:spPr/>
+        <p:txBody>
+          <a:bodyPr/>
+          <a:lstStyle/>
+          <a:p>
+            <a:r>
+              <a:rPr lang="en-US" altLang="zh-CN" dirty="0" smtClean="0"/>
+              <a:t>Game Of Life</a:t>
+            </a:r>
+            <a:endParaRPr lang="en-US" dirty="0"/>
+          </a:p>
+        </p:txBody>
+      </p:sp>
+      <p:sp>
+        <p:nvSpPr>
+          <p:cNvPr id="3" name="TextBox 2"/>
+          <p:cNvSpPr txBox="1"/>
+          <p:nvPr/>
+        </p:nvSpPr>
+        <p:spPr>
+          <a:xfrm>
+            <a:off x="957714" y="2133600"/>
+            <a:ext cx="2796920" cy="1200329"/>
+          </a:xfrm>
+          <a:prstGeom prst="rect">
+            <a:avLst/>
+          </a:prstGeom>
+        </p:spPr>
+        <p:style>
+          <a:lnRef idx="2">
+            <a:schemeClr val="accent1"/>
+          </a:lnRef>
+          <a:fillRef idx="1">
+            <a:schemeClr val="lt1"/>
+          </a:fillRef>
+          <a:effectRef idx="0">
+            <a:schemeClr val="accent1"/>
+          </a:effectRef>
+          <a:fontRef idx="minor">
+            <a:schemeClr val="dk1"/>
+          </a:fontRef>
+        </p:style>
+        <p:txBody>
+          <a:bodyPr wrap="none" rtlCol="0">
+            <a:spAutoFit/>
+          </a:bodyPr>
+          <a:lstStyle/>
+          <a:p>
+            <a:r>
+              <a:rPr lang="en-US" altLang="zh-CN" dirty="0" smtClean="0"/>
+              <a:t>Configure File Sample 1</a:t>
+            </a:r>
+          </a:p>
+          <a:p>
+            <a:endParaRPr lang="en-US" altLang="zh-CN" dirty="0"/>
+          </a:p>
+          <a:p>
+            <a:r>
+              <a:rPr lang="en-US" altLang="zh-CN" dirty="0"/>
+              <a:t>d</a:t>
+            </a:r>
+            <a:r>
+              <a:rPr lang="en-US" altLang="zh-CN" dirty="0" smtClean="0"/>
+              <a:t>imension: 4,4</a:t>
+            </a:r>
+          </a:p>
+          <a:p>
+            <a:r>
+              <a:rPr lang="en-US" altLang="zh-CN" dirty="0" err="1"/>
+              <a:t>a</a:t>
+            </a:r>
+            <a:r>
+              <a:rPr lang="en-US" altLang="zh-CN" dirty="0" err="1" smtClean="0"/>
+              <a:t>live_Cells</a:t>
+            </a:r>
+            <a:r>
+              <a:rPr lang="en-US" altLang="zh-CN" dirty="0" smtClean="0"/>
+              <a:t>: 1,1; 1,2; 2,1; 2,2</a:t>
+            </a:r>
+            <a:endParaRPr lang="en-US" dirty="0"/>
+          </a:p>
+        </p:txBody>
+      </p:sp>
+      <p:sp>
+        <p:nvSpPr>
+          <p:cNvPr id="5" name="TextBox 4"/>
+          <p:cNvSpPr txBox="1"/>
+          <p:nvPr/>
+        </p:nvSpPr>
+        <p:spPr>
+          <a:xfrm>
+            <a:off x="956110" y="4648200"/>
+            <a:ext cx="4758995" cy="1754326"/>
+          </a:xfrm>
+          <a:prstGeom prst="rect">
+            <a:avLst/>
+          </a:prstGeom>
+        </p:spPr>
+        <p:style>
+          <a:lnRef idx="2">
+            <a:schemeClr val="accent2"/>
+          </a:lnRef>
+          <a:fillRef idx="1">
+            <a:schemeClr val="lt1"/>
+          </a:fillRef>
+          <a:effectRef idx="0">
+            <a:schemeClr val="accent2"/>
+          </a:effectRef>
+          <a:fontRef idx="minor">
+            <a:schemeClr val="dk1"/>
+          </a:fontRef>
+        </p:style>
+        <p:txBody>
+          <a:bodyPr wrap="none" rtlCol="0">
+            <a:spAutoFit/>
+          </a:bodyPr>
+          <a:lstStyle/>
+          <a:p>
+            <a:r>
+              <a:rPr lang="en-US" altLang="zh-CN" dirty="0" smtClean="0"/>
+              <a:t>Configure File Sample 2</a:t>
+            </a:r>
+          </a:p>
+          <a:p>
+            <a:endParaRPr lang="en-US" altLang="zh-CN" dirty="0"/>
+          </a:p>
+          <a:p>
+            <a:r>
+              <a:rPr lang="en-US" altLang="zh-CN" dirty="0" smtClean="0"/>
+              <a:t>{  </a:t>
+            </a:r>
+          </a:p>
+          <a:p>
+            <a:r>
+              <a:rPr lang="en-US" altLang="zh-CN" dirty="0"/>
+              <a:t> </a:t>
+            </a:r>
+            <a:r>
+              <a:rPr lang="en-US" altLang="zh-CN" dirty="0" smtClean="0"/>
+              <a:t>   "dimension": {    "width": 4,    "height": 4  },  </a:t>
+            </a:r>
+          </a:p>
+          <a:p>
+            <a:r>
+              <a:rPr lang="en-US" altLang="zh-CN" dirty="0"/>
+              <a:t> </a:t>
+            </a:r>
+            <a:r>
+              <a:rPr lang="en-US" altLang="zh-CN" dirty="0" smtClean="0"/>
+              <a:t>   "</a:t>
+            </a:r>
+            <a:r>
+              <a:rPr lang="en-US" altLang="zh-CN" dirty="0" err="1" smtClean="0"/>
+              <a:t>alive_cells</a:t>
+            </a:r>
+            <a:r>
+              <a:rPr lang="en-US" altLang="zh-CN" dirty="0" smtClean="0"/>
+              <a:t>": [    [1,1],    [1,2],    [2,1],    [2,2]    ]</a:t>
+            </a:r>
+          </a:p>
+          <a:p>
+            <a:r>
+              <a:rPr lang="en-US" altLang="zh-CN" dirty="0" smtClean="0"/>
+              <a:t>}</a:t>
+            </a:r>
+            <a:endParaRPr lang="en-US" dirty="0"/>
+          </a:p>
+        </p:txBody>
+      </p:sp>
+      <p:sp>
+        <p:nvSpPr>
+          <p:cNvPr id="6" name="TextBox 5"/>
+          <p:cNvSpPr txBox="1"/>
+          <p:nvPr/>
+        </p:nvSpPr>
+        <p:spPr>
+          <a:xfrm>
+            <a:off x="5257800" y="1371600"/>
+            <a:ext cx="3721981" cy="3139321"/>
+          </a:xfrm>
+          <a:prstGeom prst="rect">
+            <a:avLst/>
+          </a:prstGeom>
+        </p:spPr>
+        <p:style>
+          <a:lnRef idx="2">
+            <a:schemeClr val="accent6"/>
+          </a:lnRef>
+          <a:fillRef idx="1">
+            <a:schemeClr val="lt1"/>
+          </a:fillRef>
+          <a:effectRef idx="0">
+            <a:schemeClr val="accent6"/>
+          </a:effectRef>
+          <a:fontRef idx="minor">
+            <a:schemeClr val="dk1"/>
+          </a:fontRef>
+        </p:style>
+        <p:txBody>
+          <a:bodyPr wrap="none" rtlCol="0">
+            <a:spAutoFit/>
+          </a:bodyPr>
+          <a:lstStyle/>
+          <a:p>
+            <a:r>
+              <a:rPr lang="en-US" altLang="zh-CN" dirty="0" smtClean="0"/>
+              <a:t>Configure File Sample 3</a:t>
+            </a:r>
+          </a:p>
+          <a:p>
+            <a:endParaRPr lang="en-US" altLang="zh-CN" dirty="0"/>
+          </a:p>
+          <a:p>
+            <a:r>
+              <a:rPr lang="en-US" altLang="zh-CN" dirty="0" smtClean="0"/>
+              <a:t>&lt;configure&gt;</a:t>
+            </a:r>
+          </a:p>
+          <a:p>
+            <a:r>
+              <a:rPr lang="en-US" altLang="zh-CN" dirty="0"/>
+              <a:t> </a:t>
+            </a:r>
+            <a:r>
+              <a:rPr lang="en-US" altLang="zh-CN" dirty="0" smtClean="0"/>
+              <a:t>   &lt;dimension  width= 4 height= 4 /&gt;  </a:t>
+            </a:r>
+          </a:p>
+          <a:p>
+            <a:r>
+              <a:rPr lang="en-US" altLang="zh-CN" dirty="0"/>
+              <a:t> </a:t>
+            </a:r>
+            <a:r>
+              <a:rPr lang="en-US" altLang="zh-CN" dirty="0" smtClean="0"/>
+              <a:t>   &lt;</a:t>
+            </a:r>
+            <a:r>
+              <a:rPr lang="en-US" altLang="zh-CN" dirty="0" err="1" smtClean="0"/>
+              <a:t>alive_cells</a:t>
+            </a:r>
+            <a:r>
+              <a:rPr lang="en-US" altLang="zh-CN" dirty="0" smtClean="0"/>
+              <a:t>&gt;</a:t>
+            </a:r>
+          </a:p>
+          <a:p>
+            <a:r>
+              <a:rPr lang="en-US" altLang="zh-CN" dirty="0"/>
+              <a:t> </a:t>
+            </a:r>
+            <a:r>
+              <a:rPr lang="en-US" altLang="zh-CN" dirty="0" smtClean="0"/>
+              <a:t>         &lt;</a:t>
+            </a:r>
+            <a:r>
+              <a:rPr lang="en-US" altLang="zh-CN" dirty="0" err="1" smtClean="0"/>
+              <a:t>alive_cell</a:t>
+            </a:r>
+            <a:r>
+              <a:rPr lang="en-US" altLang="zh-CN" dirty="0"/>
+              <a:t> </a:t>
+            </a:r>
+            <a:r>
+              <a:rPr lang="en-US" altLang="zh-CN" dirty="0" smtClean="0"/>
+              <a:t>x=1 y=1/&gt;</a:t>
+            </a:r>
+          </a:p>
+          <a:p>
+            <a:r>
+              <a:rPr lang="en-US" altLang="zh-CN" dirty="0" smtClean="0"/>
+              <a:t>          &lt;</a:t>
+            </a:r>
+            <a:r>
+              <a:rPr lang="en-US" altLang="zh-CN" dirty="0" err="1" smtClean="0"/>
+              <a:t>alive_cell</a:t>
+            </a:r>
+            <a:r>
+              <a:rPr lang="en-US" altLang="zh-CN" dirty="0" smtClean="0"/>
+              <a:t> x=1 y=2/&gt;</a:t>
+            </a:r>
+          </a:p>
+          <a:p>
+            <a:r>
+              <a:rPr lang="en-US" altLang="zh-CN" dirty="0" smtClean="0"/>
+              <a:t>          &lt;</a:t>
+            </a:r>
+            <a:r>
+              <a:rPr lang="en-US" altLang="zh-CN" dirty="0" err="1" smtClean="0"/>
+              <a:t>alive_cell</a:t>
+            </a:r>
+            <a:r>
+              <a:rPr lang="en-US" altLang="zh-CN" dirty="0" smtClean="0"/>
+              <a:t> x=2 y=1/&gt;</a:t>
+            </a:r>
+          </a:p>
+          <a:p>
+            <a:r>
+              <a:rPr lang="en-US" altLang="zh-CN" dirty="0" smtClean="0"/>
+              <a:t>          &lt;</a:t>
+            </a:r>
+            <a:r>
+              <a:rPr lang="en-US" altLang="zh-CN" dirty="0" err="1" smtClean="0"/>
+              <a:t>alive_cell</a:t>
+            </a:r>
+            <a:r>
+              <a:rPr lang="en-US" altLang="zh-CN" dirty="0" smtClean="0"/>
+              <a:t> x=2 y=2/&gt;</a:t>
+            </a:r>
+          </a:p>
+          <a:p>
+            <a:r>
+              <a:rPr lang="en-US" altLang="zh-CN" dirty="0"/>
+              <a:t> </a:t>
+            </a:r>
+            <a:r>
+              <a:rPr lang="en-US" altLang="zh-CN" dirty="0" smtClean="0"/>
+              <a:t>    &lt;/</a:t>
+            </a:r>
+            <a:r>
+              <a:rPr lang="en-US" altLang="zh-CN" dirty="0" err="1" smtClean="0"/>
+              <a:t>alive_cells</a:t>
+            </a:r>
+            <a:r>
+              <a:rPr lang="en-US" altLang="zh-CN" dirty="0" smtClean="0"/>
+              <a:t>&gt;</a:t>
+            </a:r>
+          </a:p>
+          <a:p>
+            <a:r>
+              <a:rPr lang="en-US" dirty="0" smtClean="0"/>
+              <a:t>&lt;/configure&gt;</a:t>
+            </a:r>
+            <a:endParaRPr lang="en-US" dirty="0"/>
+          </a:p>
+        </p:txBody>
+      </p:sp>
+      <p:pic>
+        <p:nvPicPr>
+          <p:cNvPr id="7" name="Picture 6"/>
+          <p:cNvPicPr>
+            <a:picLocks noChangeAspect="1"/>
+          </p:cNvPicPr>
+          <p:nvPr/>
+        </p:nvPicPr>
+        <p:blipFill>
+          <a:blip r:embed="rId2">
+            <a:extLst>
+              <a:ext uri="{28A0092B-C50C-407E-A947-70E740481C1C}">
+                <a14:useLocalDpi xmlns:a14="http://schemas.microsoft.com/office/drawing/2010/main" val="0"/>
+              </a:ext>
+            </a:extLst>
+          </a:blip>
+          <a:stretch>
+            <a:fillRect/>
+          </a:stretch>
+        </p:blipFill>
+        <p:spPr>
+          <a:xfrm>
+            <a:off x="1016188" y="1371600"/>
+            <a:ext cx="419100" cy="419100"/>
+          </a:xfrm>
+          <a:prstGeom prst="rect">
+            <a:avLst/>
+          </a:prstGeom>
+        </p:spPr>
+      </p:pic>
+    </p:spTree>
+    <p:extLst>
+      <p:ext uri="{BB962C8B-B14F-4D97-AF65-F5344CB8AC3E}">
+        <p14:creationId xmlns:p14="http://schemas.microsoft.com/office/powerpoint/2010/main" val="2363956563"/>
+      </p:ext>
+    </p:extLst>
+  </p:cSld>
+  <p:clrMapOvr>
+    <a:masterClrMapping/>
+  </p:clrMapOvr>
+  <p:timing>
+    <p:tnLst>
+      <p:par>
+        <p:cTn id="1" dur="indefinite" restart="never" nodeType="tmRoot"/>
+      </p:par>
+    </p:tnLst>
+  </p:timing>
+</p:sld>
+</file>
+
+<file path=ppt/slides/slide6.xml><?xml version="1.0" encoding="utf-8"?>
+<p:sld xmlns:a="http://schemas.openxmlformats.org/drawingml/2006/main" xmlns:r="http://schemas.openxmlformats.org/officeDocument/2006/relationships" xmlns:p="http://schemas.openxmlformats.org/presentationml/2006/main">
+  <p:cSld>
+    <p:spTree>
+      <p:nvGrpSpPr>
+        <p:cNvPr id="1" name=""/>
+        <p:cNvGrpSpPr/>
+        <p:nvPr/>
+      </p:nvGrpSpPr>
+      <p:grpSpPr>
+        <a:xfrm>
+          <a:off x="0" y="0"/>
+          <a:ext cx="0" cy="0"/>
+          <a:chOff x="0" y="0"/>
+          <a:chExt cx="0" cy="0"/>
+        </a:xfrm>
+      </p:grpSpPr>
+      <p:pic>
+        <p:nvPicPr>
+          <p:cNvPr id="2050" name="Picture 2" descr="ATDD and TDD"/>
+          <p:cNvPicPr>
+            <a:picLocks noChangeAspect="1" noChangeArrowheads="1"/>
+          </p:cNvPicPr>
+          <p:nvPr/>
+        </p:nvPicPr>
+        <p:blipFill>
+          <a:blip r:embed="rId2">
+            <a:extLst>
+              <a:ext uri="{28A0092B-C50C-407E-A947-70E740481C1C}">
+                <a14:useLocalDpi xmlns:a14="http://schemas.microsoft.com/office/drawing/2010/main" val="0"/>
+              </a:ext>
+            </a:extLst>
+          </a:blip>
+          <a:srcRect/>
+          <a:stretch>
+            <a:fillRect/>
+          </a:stretch>
+        </p:blipFill>
+        <p:spPr bwMode="auto">
+          <a:xfrm>
+            <a:off x="1828800" y="152399"/>
+            <a:ext cx="7010400" cy="6480689"/>
+          </a:xfrm>
+          <a:prstGeom prst="rect">
+            <a:avLst/>
+          </a:prstGeom>
+          <a:noFill/>
+          <a:extLst>
+            <a:ext uri="{909E8E84-426E-40DD-AFC4-6F175D3DCCD1}">
+              <a14:hiddenFill xmlns:a14="http://schemas.microsoft.com/office/drawing/2010/main">
+                <a:solidFill>
+                  <a:srgbClr val="FFFFFF"/>
+                </a:solidFill>
+              </a14:hiddenFill>
+            </a:ext>
+          </a:extLst>
+        </p:spPr>
+      </p:pic>
+      <p:sp>
+        <p:nvSpPr>
+          <p:cNvPr id="3" name="TextBox 2"/>
+          <p:cNvSpPr txBox="1"/>
+          <p:nvPr/>
+        </p:nvSpPr>
+        <p:spPr>
+          <a:xfrm>
+            <a:off x="152400" y="152400"/>
+            <a:ext cx="2321533" cy="1754326"/>
+          </a:xfrm>
+          <a:prstGeom prst="rect">
+            <a:avLst/>
+          </a:prstGeom>
+        </p:spPr>
+        <p:style>
+          <a:lnRef idx="2">
+            <a:schemeClr val="accent5"/>
+          </a:lnRef>
+          <a:fillRef idx="1">
+            <a:schemeClr val="lt1"/>
+          </a:fillRef>
+          <a:effectRef idx="0">
+            <a:schemeClr val="accent5"/>
+          </a:effectRef>
+          <a:fontRef idx="minor">
+            <a:schemeClr val="dk1"/>
+          </a:fontRef>
+        </p:style>
+        <p:txBody>
+          <a:bodyPr wrap="none" rtlCol="0">
+            <a:spAutoFit/>
+          </a:bodyPr>
+          <a:lstStyle/>
+          <a:p>
+            <a:r>
+              <a:rPr lang="en-US" altLang="zh-CN" dirty="0" smtClean="0"/>
+              <a:t>Requirement </a:t>
+            </a:r>
+            <a:r>
+              <a:rPr lang="en-US" altLang="zh-CN" dirty="0" smtClean="0">
+                <a:sym typeface="Wingdings" panose="05000000000000000000" pitchFamily="2" charset="2"/>
+              </a:rPr>
+              <a:t></a:t>
+            </a:r>
+          </a:p>
+          <a:p>
+            <a:r>
+              <a:rPr lang="en-US" altLang="zh-CN" dirty="0" smtClean="0">
+                <a:sym typeface="Wingdings" panose="05000000000000000000" pitchFamily="2" charset="2"/>
+              </a:rPr>
+              <a:t>Big Story  </a:t>
+            </a:r>
+          </a:p>
+          <a:p>
+            <a:r>
+              <a:rPr lang="en-US" altLang="zh-CN" dirty="0" smtClean="0">
+                <a:sym typeface="Wingdings" panose="05000000000000000000" pitchFamily="2" charset="2"/>
+              </a:rPr>
+              <a:t>Small Stories  </a:t>
+            </a:r>
+          </a:p>
+          <a:p>
+            <a:r>
+              <a:rPr lang="en-US" altLang="zh-CN" dirty="0" smtClean="0">
+                <a:sym typeface="Wingdings" panose="05000000000000000000" pitchFamily="2" charset="2"/>
+              </a:rPr>
+              <a:t>Scenarios  </a:t>
+            </a:r>
+          </a:p>
+          <a:p>
+            <a:r>
+              <a:rPr lang="en-US" altLang="zh-CN" dirty="0" smtClean="0">
+                <a:sym typeface="Wingdings" panose="05000000000000000000" pitchFamily="2" charset="2"/>
+              </a:rPr>
+              <a:t>Acceptance Criteria </a:t>
+            </a:r>
+          </a:p>
+          <a:p>
+            <a:endParaRPr lang="en-US" altLang="zh-CN" dirty="0" smtClean="0">
+              <a:sym typeface="Wingdings" panose="05000000000000000000" pitchFamily="2" charset="2"/>
+            </a:endParaRPr>
+          </a:p>
+        </p:txBody>
+      </p:sp>
+      <p:sp>
+        <p:nvSpPr>
+          <p:cNvPr id="5" name="TextBox 4"/>
+          <p:cNvSpPr txBox="1"/>
+          <p:nvPr/>
+        </p:nvSpPr>
+        <p:spPr>
+          <a:xfrm>
+            <a:off x="4419600" y="440612"/>
+            <a:ext cx="1335622" cy="369332"/>
+          </a:xfrm>
+          <a:prstGeom prst="rect">
+            <a:avLst/>
+          </a:prstGeom>
+        </p:spPr>
+        <p:style>
+          <a:lnRef idx="2">
+            <a:schemeClr val="accent6"/>
+          </a:lnRef>
+          <a:fillRef idx="1">
+            <a:schemeClr val="lt1"/>
+          </a:fillRef>
+          <a:effectRef idx="0">
+            <a:schemeClr val="accent6"/>
+          </a:effectRef>
+          <a:fontRef idx="minor">
+            <a:schemeClr val="dk1"/>
+          </a:fontRef>
+        </p:style>
+        <p:txBody>
+          <a:bodyPr wrap="none" rtlCol="0">
+            <a:spAutoFit/>
+          </a:bodyPr>
+          <a:lstStyle/>
+          <a:p>
+            <a:r>
+              <a:rPr lang="en-US" dirty="0" smtClean="0">
+                <a:solidFill>
+                  <a:srgbClr val="FF0000"/>
+                </a:solidFill>
+              </a:rPr>
+              <a:t>Class Design</a:t>
+            </a:r>
+          </a:p>
+        </p:txBody>
+      </p:sp>
+      <p:sp>
+        <p:nvSpPr>
+          <p:cNvPr id="6" name="TextBox 5"/>
+          <p:cNvSpPr txBox="1"/>
+          <p:nvPr/>
+        </p:nvSpPr>
+        <p:spPr>
+          <a:xfrm>
+            <a:off x="2743200" y="2322493"/>
+            <a:ext cx="1222203" cy="954107"/>
+          </a:xfrm>
+          <a:prstGeom prst="rect">
+            <a:avLst/>
+          </a:prstGeom>
+        </p:spPr>
+        <p:style>
+          <a:lnRef idx="2">
+            <a:schemeClr val="accent6"/>
+          </a:lnRef>
+          <a:fillRef idx="1">
+            <a:schemeClr val="lt1"/>
+          </a:fillRef>
+          <a:effectRef idx="0">
+            <a:schemeClr val="accent6"/>
+          </a:effectRef>
+          <a:fontRef idx="minor">
+            <a:schemeClr val="dk1"/>
+          </a:fontRef>
+        </p:style>
+        <p:txBody>
+          <a:bodyPr wrap="square" rtlCol="0">
+            <a:spAutoFit/>
+          </a:bodyPr>
+          <a:lstStyle/>
+          <a:p>
+            <a:r>
+              <a:rPr lang="en-US" sz="1400" dirty="0" smtClean="0">
+                <a:solidFill>
+                  <a:srgbClr val="FF0000"/>
+                </a:solidFill>
+              </a:rPr>
+              <a:t>Activity &amp; Sequence</a:t>
+            </a:r>
+          </a:p>
+          <a:p>
+            <a:r>
+              <a:rPr lang="en-US" sz="1400" dirty="0" smtClean="0">
+                <a:solidFill>
+                  <a:srgbClr val="FF0000"/>
+                </a:solidFill>
+              </a:rPr>
+              <a:t>Design (New class/method)</a:t>
+            </a:r>
+            <a:endParaRPr lang="en-US" sz="1400" dirty="0">
+              <a:solidFill>
+                <a:srgbClr val="FF0000"/>
+              </a:solidFill>
+            </a:endParaRPr>
+          </a:p>
+        </p:txBody>
+      </p:sp>
+    </p:spTree>
+    <p:extLst>
+      <p:ext uri="{BB962C8B-B14F-4D97-AF65-F5344CB8AC3E}">
+        <p14:creationId xmlns:p14="http://schemas.microsoft.com/office/powerpoint/2010/main" val="3397547944"/>
+      </p:ext>
+    </p:extLst>
+  </p:cSld>
+  <p:clrMapOvr>
+    <a:masterClrMapping/>
+  </p:clrMapOvr>
+  <p:timing>
+    <p:tnLst>
+      <p:par>
+        <p:cTn id="1" dur="indefinite" restart="never" nodeType="tmRoot">
+          <p:childTnLst>
+            <p:seq concurrent="1" nextAc="seek">
+              <p:cTn id="2" dur="indefinite" nodeType="mainSeq">
+                <p:childTnLst>
+                  <p:par>
+                    <p:cTn id="3" fill="hold">
+                      <p:stCondLst>
+                        <p:cond delay="indefinite"/>
+                      </p:stCondLst>
+                      <p:childTnLst>
+                        <p:par>
+                          <p:cTn id="4" fill="hold">
+                            <p:stCondLst>
+                              <p:cond delay="0"/>
+                            </p:stCondLst>
+                            <p:childTnLst>
+                              <p:par>
+                                <p:cTn id="5" presetID="10" presetClass="entr" presetSubtype="0" fill="hold" grpId="0" nodeType="clickEffect">
+                                  <p:stCondLst>
+                                    <p:cond delay="0"/>
+                                  </p:stCondLst>
+                                  <p:childTnLst>
+                                    <p:set>
+                                      <p:cBhvr>
+                                        <p:cTn id="6" dur="1" fill="hold">
+                                          <p:stCondLst>
+                                            <p:cond delay="0"/>
+                                          </p:stCondLst>
+                                        </p:cTn>
+                                        <p:tgtEl>
+                                          <p:spTgt spid="5"/>
+                                        </p:tgtEl>
+                                        <p:attrNameLst>
+                                          <p:attrName>style.visibility</p:attrName>
+                                        </p:attrNameLst>
+                                      </p:cBhvr>
+                                      <p:to>
+                                        <p:strVal val="visible"/>
+                                      </p:to>
+                                    </p:set>
+                                    <p:animEffect transition="in" filter="fade">
+                                      <p:cBhvr>
+                                        <p:cTn id="7" dur="500"/>
+                                        <p:tgtEl>
+                                          <p:spTgt spid="5"/>
+                                        </p:tgtEl>
+                                      </p:cBhvr>
+                                    </p:animEffect>
+                                  </p:childTnLst>
+                                </p:cTn>
+                              </p:par>
+                            </p:childTnLst>
+                          </p:cTn>
+                        </p:par>
+                      </p:childTnLst>
+                    </p:cTn>
+                  </p:par>
+                  <p:par>
+                    <p:cTn id="8" fill="hold">
+                      <p:stCondLst>
+                        <p:cond delay="indefinite"/>
+                      </p:stCondLst>
+                      <p:childTnLst>
+                        <p:par>
+                          <p:cTn id="9" fill="hold">
+                            <p:stCondLst>
+                              <p:cond delay="0"/>
+                            </p:stCondLst>
+                            <p:childTnLst>
+                              <p:par>
+                                <p:cTn id="10" presetID="10" presetClass="entr" presetSubtype="0" fill="hold" grpId="0" nodeType="clickEffect">
+                                  <p:stCondLst>
+                                    <p:cond delay="0"/>
+                                  </p:stCondLst>
+                                  <p:childTnLst>
+                                    <p:set>
+                                      <p:cBhvr>
+                                        <p:cTn id="11" dur="1" fill="hold">
+                                          <p:stCondLst>
+                                            <p:cond delay="0"/>
+                                          </p:stCondLst>
+                                        </p:cTn>
+                                        <p:tgtEl>
+                                          <p:spTgt spid="6"/>
+                                        </p:tgtEl>
+                                        <p:attrNameLst>
+                                          <p:attrName>style.visibility</p:attrName>
+                                        </p:attrNameLst>
+                                      </p:cBhvr>
+                                      <p:to>
+                                        <p:strVal val="visible"/>
+                                      </p:to>
+                                    </p:set>
+                                    <p:animEffect transition="in" filter="fade">
+                                      <p:cBhvr>
+                                        <p:cTn id="12" dur="500"/>
+                                        <p:tgtEl>
+                                          <p:spTgt spid="6"/>
+                                        </p:tgtEl>
+                                      </p:cBhvr>
+                                    </p:animEffect>
+                                  </p:childTnLst>
+                                </p:cTn>
+                              </p:par>
+                            </p:childTnLst>
+                          </p:cTn>
+                        </p:par>
+                      </p:childTnLst>
+                    </p:cTn>
+                  </p:par>
+                </p:childTnLst>
+              </p:cTn>
+              <p:prevCondLst>
+                <p:cond evt="onPrev" delay="0">
+                  <p:tgtEl>
+                    <p:sldTgt/>
+                  </p:tgtEl>
+                </p:cond>
+              </p:prevCondLst>
+              <p:nextCondLst>
+                <p:cond evt="onNext" delay="0">
+                  <p:tgtEl>
+                    <p:sldTgt/>
+                  </p:tgtEl>
+                </p:cond>
+              </p:nextCondLst>
+            </p:seq>
+          </p:childTnLst>
+        </p:cTn>
+      </p:par>
+    </p:tnLst>
+    <p:bldLst>
+      <p:bldP spid="5" grpId="0" animBg="1"/>
+      <p:bldP spid="6" grpId="0" animBg="1"/>
+    </p:bldLst>
+  </p:timing>
 </p:sld>
 </file>
 

</xml_diff>